<commit_message>
push editing of slides
</commit_message>
<xml_diff>
--- a/Day_1/Case_Study/Day_1_CaseStudy_DCAcad.pptx
+++ b/Day_1/Case_Study/Day_1_CaseStudy_DCAcad.pptx
@@ -5,26 +5,27 @@
     <p:sldMasterId id="2147483648" r:id="rId1"/>
   </p:sldMasterIdLst>
   <p:notesMasterIdLst>
-    <p:notesMasterId r:id="rId19"/>
+    <p:notesMasterId r:id="rId20"/>
   </p:notesMasterIdLst>
   <p:sldIdLst>
     <p:sldId id="256" r:id="rId2"/>
     <p:sldId id="259" r:id="rId3"/>
-    <p:sldId id="260" r:id="rId4"/>
-    <p:sldId id="261" r:id="rId5"/>
-    <p:sldId id="262" r:id="rId6"/>
-    <p:sldId id="263" r:id="rId7"/>
-    <p:sldId id="269" r:id="rId8"/>
-    <p:sldId id="270" r:id="rId9"/>
-    <p:sldId id="271" r:id="rId10"/>
-    <p:sldId id="272" r:id="rId11"/>
-    <p:sldId id="257" r:id="rId12"/>
-    <p:sldId id="264" r:id="rId13"/>
-    <p:sldId id="266" r:id="rId14"/>
-    <p:sldId id="265" r:id="rId15"/>
-    <p:sldId id="267" r:id="rId16"/>
-    <p:sldId id="258" r:id="rId17"/>
-    <p:sldId id="268" r:id="rId18"/>
+    <p:sldId id="273" r:id="rId4"/>
+    <p:sldId id="274" r:id="rId5"/>
+    <p:sldId id="261" r:id="rId6"/>
+    <p:sldId id="262" r:id="rId7"/>
+    <p:sldId id="263" r:id="rId8"/>
+    <p:sldId id="269" r:id="rId9"/>
+    <p:sldId id="270" r:id="rId10"/>
+    <p:sldId id="271" r:id="rId11"/>
+    <p:sldId id="272" r:id="rId12"/>
+    <p:sldId id="257" r:id="rId13"/>
+    <p:sldId id="264" r:id="rId14"/>
+    <p:sldId id="266" r:id="rId15"/>
+    <p:sldId id="265" r:id="rId16"/>
+    <p:sldId id="267" r:id="rId17"/>
+    <p:sldId id="258" r:id="rId18"/>
+    <p:sldId id="268" r:id="rId19"/>
   </p:sldIdLst>
   <p:sldSz cx="9144000" cy="6858000" type="screen4x3"/>
   <p:notesSz cx="6858000" cy="9144000"/>
@@ -208,7 +209,7 @@
           <a:p>
             <a:fld id="{6F9630DF-B6D4-9946-8058-C28FEFA82E3B}" type="datetimeFigureOut">
               <a:rPr lang="en-US" smtClean="0"/>
-              <a:t>2/14/15</a:t>
+              <a:t>2/15/15</a:t>
             </a:fld>
             <a:endParaRPr lang="en-US"/>
           </a:p>
@@ -549,7 +550,7 @@
           <a:p>
             <a:fld id="{9CCC3976-A15B-0A43-971F-C1ADE5221AC9}" type="slidenum">
               <a:rPr lang="en-US" smtClean="0"/>
-              <a:t>9</a:t>
+              <a:t>10</a:t>
             </a:fld>
             <a:endParaRPr lang="en-US"/>
           </a:p>
@@ -641,7 +642,7 @@
           <a:p>
             <a:fld id="{9CCC3976-A15B-0A43-971F-C1ADE5221AC9}" type="slidenum">
               <a:rPr lang="en-US" smtClean="0"/>
-              <a:t>11</a:t>
+              <a:t>12</a:t>
             </a:fld>
             <a:endParaRPr lang="en-US"/>
           </a:p>
@@ -841,7 +842,7 @@
           <a:p>
             <a:fld id="{9D6228D5-5F93-BB4A-964B-203967C46295}" type="datetimeFigureOut">
               <a:rPr lang="en-US" smtClean="0"/>
-              <a:t>2/14/15</a:t>
+              <a:t>2/15/15</a:t>
             </a:fld>
             <a:endParaRPr lang="en-US"/>
           </a:p>
@@ -1011,7 +1012,7 @@
           <a:p>
             <a:fld id="{9D6228D5-5F93-BB4A-964B-203967C46295}" type="datetimeFigureOut">
               <a:rPr lang="en-US" smtClean="0"/>
-              <a:t>2/14/15</a:t>
+              <a:t>2/15/15</a:t>
             </a:fld>
             <a:endParaRPr lang="en-US"/>
           </a:p>
@@ -1191,7 +1192,7 @@
           <a:p>
             <a:fld id="{9D6228D5-5F93-BB4A-964B-203967C46295}" type="datetimeFigureOut">
               <a:rPr lang="en-US" smtClean="0"/>
-              <a:t>2/14/15</a:t>
+              <a:t>2/15/15</a:t>
             </a:fld>
             <a:endParaRPr lang="en-US"/>
           </a:p>
@@ -1361,7 +1362,7 @@
           <a:p>
             <a:fld id="{9D6228D5-5F93-BB4A-964B-203967C46295}" type="datetimeFigureOut">
               <a:rPr lang="en-US" smtClean="0"/>
-              <a:t>2/14/15</a:t>
+              <a:t>2/15/15</a:t>
             </a:fld>
             <a:endParaRPr lang="en-US"/>
           </a:p>
@@ -1607,7 +1608,7 @@
           <a:p>
             <a:fld id="{9D6228D5-5F93-BB4A-964B-203967C46295}" type="datetimeFigureOut">
               <a:rPr lang="en-US" smtClean="0"/>
-              <a:t>2/14/15</a:t>
+              <a:t>2/15/15</a:t>
             </a:fld>
             <a:endParaRPr lang="en-US"/>
           </a:p>
@@ -1895,7 +1896,7 @@
           <a:p>
             <a:fld id="{9D6228D5-5F93-BB4A-964B-203967C46295}" type="datetimeFigureOut">
               <a:rPr lang="en-US" smtClean="0"/>
-              <a:t>2/14/15</a:t>
+              <a:t>2/15/15</a:t>
             </a:fld>
             <a:endParaRPr lang="en-US"/>
           </a:p>
@@ -2317,7 +2318,7 @@
           <a:p>
             <a:fld id="{9D6228D5-5F93-BB4A-964B-203967C46295}" type="datetimeFigureOut">
               <a:rPr lang="en-US" smtClean="0"/>
-              <a:t>2/14/15</a:t>
+              <a:t>2/15/15</a:t>
             </a:fld>
             <a:endParaRPr lang="en-US"/>
           </a:p>
@@ -2435,7 +2436,7 @@
           <a:p>
             <a:fld id="{9D6228D5-5F93-BB4A-964B-203967C46295}" type="datetimeFigureOut">
               <a:rPr lang="en-US" smtClean="0"/>
-              <a:t>2/14/15</a:t>
+              <a:t>2/15/15</a:t>
             </a:fld>
             <a:endParaRPr lang="en-US"/>
           </a:p>
@@ -2530,7 +2531,7 @@
           <a:p>
             <a:fld id="{9D6228D5-5F93-BB4A-964B-203967C46295}" type="datetimeFigureOut">
               <a:rPr lang="en-US" smtClean="0"/>
-              <a:t>2/14/15</a:t>
+              <a:t>2/15/15</a:t>
             </a:fld>
             <a:endParaRPr lang="en-US"/>
           </a:p>
@@ -2807,7 +2808,7 @@
           <a:p>
             <a:fld id="{9D6228D5-5F93-BB4A-964B-203967C46295}" type="datetimeFigureOut">
               <a:rPr lang="en-US" smtClean="0"/>
-              <a:t>2/14/15</a:t>
+              <a:t>2/15/15</a:t>
             </a:fld>
             <a:endParaRPr lang="en-US"/>
           </a:p>
@@ -3064,7 +3065,7 @@
           <a:p>
             <a:fld id="{9D6228D5-5F93-BB4A-964B-203967C46295}" type="datetimeFigureOut">
               <a:rPr lang="en-US" smtClean="0"/>
-              <a:t>2/14/15</a:t>
+              <a:t>2/15/15</a:t>
             </a:fld>
             <a:endParaRPr lang="en-US"/>
           </a:p>
@@ -3277,7 +3278,7 @@
           <a:p>
             <a:fld id="{9D6228D5-5F93-BB4A-964B-203967C46295}" type="datetimeFigureOut">
               <a:rPr lang="en-US" smtClean="0"/>
-              <a:t>2/14/15</a:t>
+              <a:t>2/15/15</a:t>
             </a:fld>
             <a:endParaRPr lang="en-US"/>
           </a:p>
@@ -3787,6 +3788,209 @@
           <a:p>
             <a:r>
               <a:rPr lang="en-US" dirty="0" smtClean="0"/>
+              <a:t>Findings</a:t>
+            </a:r>
+            <a:endParaRPr lang="en-US" dirty="0"/>
+          </a:p>
+        </p:txBody>
+      </p:sp>
+      <p:sp>
+        <p:nvSpPr>
+          <p:cNvPr id="4" name="Rectangle 3"/>
+          <p:cNvSpPr/>
+          <p:nvPr/>
+        </p:nvSpPr>
+        <p:spPr>
+          <a:xfrm>
+            <a:off x="670550" y="3445111"/>
+            <a:ext cx="7919183" cy="923330"/>
+          </a:xfrm>
+          <a:prstGeom prst="rect">
+            <a:avLst/>
+          </a:prstGeom>
+        </p:spPr>
+        <p:txBody>
+          <a:bodyPr wrap="square">
+            <a:spAutoFit/>
+          </a:bodyPr>
+          <a:lstStyle/>
+          <a:p>
+            <a:r>
+              <a:rPr lang="en-US" dirty="0"/>
+              <a:t> “This area is very important, but is </a:t>
+            </a:r>
+            <a:r>
+              <a:rPr lang="en-US" dirty="0" smtClean="0"/>
+              <a:t>much larger </a:t>
+            </a:r>
+            <a:r>
+              <a:rPr lang="en-US" dirty="0"/>
+              <a:t>than a single institution. We need a national </a:t>
+            </a:r>
+            <a:r>
+              <a:rPr lang="en-US" dirty="0" smtClean="0"/>
+              <a:t>framework for </a:t>
+            </a:r>
+            <a:r>
+              <a:rPr lang="en-US" dirty="0"/>
+              <a:t>addressing the management, re-use and </a:t>
+            </a:r>
+            <a:r>
+              <a:rPr lang="en-US" dirty="0" smtClean="0"/>
+              <a:t>preservation of </a:t>
+            </a:r>
+            <a:r>
+              <a:rPr lang="en-US" dirty="0"/>
+              <a:t>scientific data.”</a:t>
+            </a:r>
+          </a:p>
+        </p:txBody>
+      </p:sp>
+      <p:sp>
+        <p:nvSpPr>
+          <p:cNvPr id="3" name="Rectangle 2"/>
+          <p:cNvSpPr/>
+          <p:nvPr/>
+        </p:nvSpPr>
+        <p:spPr>
+          <a:xfrm>
+            <a:off x="770819" y="1740122"/>
+            <a:ext cx="7818914" cy="1200329"/>
+          </a:xfrm>
+          <a:prstGeom prst="rect">
+            <a:avLst/>
+          </a:prstGeom>
+        </p:spPr>
+        <p:txBody>
+          <a:bodyPr wrap="square">
+            <a:spAutoFit/>
+          </a:bodyPr>
+          <a:lstStyle/>
+          <a:p>
+            <a:r>
+              <a:rPr lang="en-US" dirty="0"/>
+              <a:t>Many survey respondents </a:t>
+            </a:r>
+            <a:r>
+              <a:rPr lang="en-US" dirty="0" smtClean="0"/>
+              <a:t>cited</a:t>
+            </a:r>
+            <a:r>
+              <a:rPr lang="en-US" b="1" dirty="0" smtClean="0"/>
+              <a:t> lack </a:t>
+            </a:r>
+            <a:r>
+              <a:rPr lang="en-US" b="1" dirty="0"/>
+              <a:t>of money and resources as the most obvious </a:t>
+            </a:r>
+            <a:r>
+              <a:rPr lang="en-US" dirty="0" smtClean="0"/>
+              <a:t>physical limitations </a:t>
+            </a:r>
+            <a:r>
+              <a:rPr lang="en-US" dirty="0"/>
+              <a:t>to quick mobilization around these issues. However,</a:t>
+            </a:r>
+          </a:p>
+          <a:p>
+            <a:r>
+              <a:rPr lang="en-US" b="1" dirty="0"/>
+              <a:t>just as compelling were pressures from lack of </a:t>
+            </a:r>
+            <a:r>
+              <a:rPr lang="en-US" b="1" dirty="0" smtClean="0"/>
+              <a:t>faculty interest </a:t>
+            </a:r>
+            <a:r>
+              <a:rPr lang="en-US" dirty="0"/>
+              <a:t>and common direction on campus. </a:t>
+            </a:r>
+          </a:p>
+        </p:txBody>
+      </p:sp>
+      <p:sp>
+        <p:nvSpPr>
+          <p:cNvPr id="5" name="Rectangle 4"/>
+          <p:cNvSpPr/>
+          <p:nvPr/>
+        </p:nvSpPr>
+        <p:spPr>
+          <a:xfrm>
+            <a:off x="2776204" y="5391103"/>
+            <a:ext cx="3507337" cy="215444"/>
+          </a:xfrm>
+          <a:prstGeom prst="rect">
+            <a:avLst/>
+          </a:prstGeom>
+        </p:spPr>
+        <p:txBody>
+          <a:bodyPr wrap="square">
+            <a:spAutoFit/>
+          </a:bodyPr>
+          <a:lstStyle/>
+          <a:p>
+            <a:r>
+              <a:rPr lang="en-US" sz="800" dirty="0"/>
+              <a:t>http://</a:t>
+            </a:r>
+            <a:r>
+              <a:rPr lang="en-US" sz="800" dirty="0" err="1"/>
+              <a:t>www.arl.org</a:t>
+            </a:r>
+            <a:r>
+              <a:rPr lang="en-US" sz="800" dirty="0"/>
+              <a:t>/storage/documents/publications/escience-report-2010.pdf</a:t>
+            </a:r>
+          </a:p>
+        </p:txBody>
+      </p:sp>
+    </p:spTree>
+    <p:extLst>
+      <p:ext uri="{BB962C8B-B14F-4D97-AF65-F5344CB8AC3E}">
+        <p14:creationId xmlns:p14="http://schemas.microsoft.com/office/powerpoint/2010/main" val="114148858"/>
+      </p:ext>
+    </p:extLst>
+  </p:cSld>
+  <p:clrMapOvr>
+    <a:masterClrMapping/>
+  </p:clrMapOvr>
+</p:sld>
+</file>
+
+<file path=ppt/slides/slide11.xml><?xml version="1.0" encoding="utf-8"?>
+<p:sld xmlns:a="http://schemas.openxmlformats.org/drawingml/2006/main" xmlns:r="http://schemas.openxmlformats.org/officeDocument/2006/relationships" xmlns:p="http://schemas.openxmlformats.org/presentationml/2006/main">
+  <p:cSld>
+    <p:spTree>
+      <p:nvGrpSpPr>
+        <p:cNvPr id="1" name=""/>
+        <p:cNvGrpSpPr/>
+        <p:nvPr/>
+      </p:nvGrpSpPr>
+      <p:grpSpPr>
+        <a:xfrm>
+          <a:off x="0" y="0"/>
+          <a:ext cx="0" cy="0"/>
+          <a:chOff x="0" y="0"/>
+          <a:chExt cx="0" cy="0"/>
+        </a:xfrm>
+      </p:grpSpPr>
+      <p:sp>
+        <p:nvSpPr>
+          <p:cNvPr id="2" name="Title 1"/>
+          <p:cNvSpPr>
+            <a:spLocks noGrp="1"/>
+          </p:cNvSpPr>
+          <p:nvPr>
+            <p:ph type="title"/>
+          </p:nvPr>
+        </p:nvSpPr>
+        <p:spPr/>
+        <p:txBody>
+          <a:bodyPr/>
+          <a:lstStyle/>
+          <a:p>
+            <a:r>
+              <a:rPr lang="en-US" dirty="0" smtClean="0"/>
               <a:t>Akers et al. 2014</a:t>
             </a:r>
             <a:endParaRPr lang="en-US" dirty="0"/>
@@ -3954,7 +4158,7 @@
 </p:sld>
 </file>
 
-<file path=ppt/slides/slide11.xml><?xml version="1.0" encoding="utf-8"?>
+<file path=ppt/slides/slide12.xml><?xml version="1.0" encoding="utf-8"?>
 <p:sld xmlns:a="http://schemas.openxmlformats.org/drawingml/2006/main" xmlns:r="http://schemas.openxmlformats.org/officeDocument/2006/relationships" xmlns:p="http://schemas.openxmlformats.org/presentationml/2006/main">
   <p:cSld>
     <p:spTree>
@@ -4210,7 +4414,7 @@
 </p:sld>
 </file>
 
-<file path=ppt/slides/slide12.xml><?xml version="1.0" encoding="utf-8"?>
+<file path=ppt/slides/slide13.xml><?xml version="1.0" encoding="utf-8"?>
 <p:sld xmlns:a="http://schemas.openxmlformats.org/drawingml/2006/main" xmlns:r="http://schemas.openxmlformats.org/officeDocument/2006/relationships" xmlns:p="http://schemas.openxmlformats.org/presentationml/2006/main">
   <p:cSld>
     <p:spTree>
@@ -4298,7 +4502,7 @@
 </p:sld>
 </file>
 
-<file path=ppt/slides/slide13.xml><?xml version="1.0" encoding="utf-8"?>
+<file path=ppt/slides/slide14.xml><?xml version="1.0" encoding="utf-8"?>
 <p:sld xmlns:a="http://schemas.openxmlformats.org/drawingml/2006/main" xmlns:r="http://schemas.openxmlformats.org/officeDocument/2006/relationships" xmlns:p="http://schemas.openxmlformats.org/presentationml/2006/main">
   <p:cSld>
     <p:spTree>
@@ -4371,7 +4575,7 @@
 </p:sld>
 </file>
 
-<file path=ppt/slides/slide14.xml><?xml version="1.0" encoding="utf-8"?>
+<file path=ppt/slides/slide15.xml><?xml version="1.0" encoding="utf-8"?>
 <p:sld xmlns:a="http://schemas.openxmlformats.org/drawingml/2006/main" xmlns:r="http://schemas.openxmlformats.org/officeDocument/2006/relationships" xmlns:p="http://schemas.openxmlformats.org/presentationml/2006/main">
   <p:cSld>
     <p:spTree>
@@ -4471,7 +4675,7 @@
 </p:sld>
 </file>
 
-<file path=ppt/slides/slide15.xml><?xml version="1.0" encoding="utf-8"?>
+<file path=ppt/slides/slide16.xml><?xml version="1.0" encoding="utf-8"?>
 <p:sld xmlns:a="http://schemas.openxmlformats.org/drawingml/2006/main" xmlns:r="http://schemas.openxmlformats.org/officeDocument/2006/relationships" xmlns:p="http://schemas.openxmlformats.org/presentationml/2006/main">
   <p:cSld>
     <p:spTree>
@@ -4538,7 +4742,7 @@
 </p:sld>
 </file>
 
-<file path=ppt/slides/slide16.xml><?xml version="1.0" encoding="utf-8"?>
+<file path=ppt/slides/slide17.xml><?xml version="1.0" encoding="utf-8"?>
 <p:sld xmlns:a="http://schemas.openxmlformats.org/drawingml/2006/main" xmlns:r="http://schemas.openxmlformats.org/officeDocument/2006/relationships" xmlns:p="http://schemas.openxmlformats.org/presentationml/2006/main">
   <p:cSld>
     <p:spTree>
@@ -4651,7 +4855,7 @@
 </p:sld>
 </file>
 
-<file path=ppt/slides/slide17.xml><?xml version="1.0" encoding="utf-8"?>
+<file path=ppt/slides/slide18.xml><?xml version="1.0" encoding="utf-8"?>
 <p:sld xmlns:a="http://schemas.openxmlformats.org/drawingml/2006/main" xmlns:r="http://schemas.openxmlformats.org/officeDocument/2006/relationships" xmlns:p="http://schemas.openxmlformats.org/presentationml/2006/main">
   <p:cSld>
     <p:spTree>
@@ -4936,124 +5140,98 @@
             <p:ph type="title"/>
           </p:nvPr>
         </p:nvSpPr>
-        <p:spPr>
-          <a:xfrm>
-            <a:off x="457200" y="331926"/>
-            <a:ext cx="8229600" cy="1143000"/>
-          </a:xfrm>
-        </p:spPr>
-        <p:txBody>
-          <a:bodyPr>
-            <a:normAutofit fontScale="90000"/>
-          </a:bodyPr>
-          <a:lstStyle/>
-          <a:p>
-            <a:r>
-              <a:rPr lang="en-US" dirty="0" smtClean="0"/>
-              <a:t>Case studies for </a:t>
+        <p:spPr/>
+        <p:txBody>
+          <a:bodyPr/>
+          <a:lstStyle/>
+          <a:p>
+            <a:r>
+              <a:rPr lang="en-US" dirty="0" smtClean="0"/>
+              <a:t>Case Study Research</a:t>
+            </a:r>
+            <a:endParaRPr lang="en-US" dirty="0"/>
+          </a:p>
+        </p:txBody>
+      </p:sp>
+      <p:sp>
+        <p:nvSpPr>
+          <p:cNvPr id="3" name="Content Placeholder 2"/>
+          <p:cNvSpPr>
+            <a:spLocks noGrp="1"/>
+          </p:cNvSpPr>
+          <p:nvPr>
+            <p:ph idx="1"/>
+          </p:nvPr>
+        </p:nvSpPr>
+        <p:spPr/>
+        <p:txBody>
+          <a:bodyPr/>
+          <a:lstStyle/>
+          <a:p>
+            <a:pPr marL="0" indent="0">
+              <a:buNone/>
+            </a:pPr>
+            <a:r>
+              <a:rPr lang="en-US" i="1" dirty="0" smtClean="0"/>
+              <a:t>…it </a:t>
+            </a:r>
+            <a:r>
+              <a:rPr lang="en-US" i="1" dirty="0"/>
+              <a:t>is not so much a method as it is a comprehensive research strategy </a:t>
+            </a:r>
+            <a:endParaRPr lang="en-US" i="1" dirty="0" smtClean="0"/>
+          </a:p>
+          <a:p>
+            <a:pPr marL="0" indent="0">
+              <a:buNone/>
+            </a:pPr>
+            <a:r>
+              <a:rPr lang="en-US" dirty="0" smtClean="0"/>
+              <a:t>	Yin</a:t>
             </a:r>
             <a:r>
               <a:rPr lang="en-US" dirty="0"/>
-              <a:t>data </a:t>
-            </a:r>
-            <a:r>
-              <a:rPr lang="en-US" dirty="0" smtClean="0"/>
-              <a:t>curation</a:t>
-            </a:r>
-            <a:r>
-              <a:rPr lang="en-US" dirty="0"/>
-              <a:t/>
-            </a:r>
-            <a:br>
-              <a:rPr lang="en-US" dirty="0"/>
-            </a:br>
+              <a:t>,2003, p. </a:t>
+            </a:r>
+            <a:r>
+              <a:rPr lang="en-US" dirty="0" smtClean="0"/>
+              <a:t>14</a:t>
+            </a:r>
             <a:endParaRPr lang="en-US" dirty="0"/>
           </a:p>
-        </p:txBody>
-      </p:sp>
-      <p:sp>
-        <p:nvSpPr>
-          <p:cNvPr id="3" name="Content Placeholder 2"/>
-          <p:cNvSpPr>
-            <a:spLocks noGrp="1"/>
-          </p:cNvSpPr>
-          <p:nvPr>
-            <p:ph idx="1"/>
-          </p:nvPr>
-        </p:nvSpPr>
-        <p:spPr/>
-        <p:txBody>
-          <a:bodyPr numCol="2"/>
-          <a:lstStyle/>
           <a:p>
             <a:pPr marL="0" indent="0">
               <a:buNone/>
-            </a:pPr>
-            <a:r>
-              <a:rPr lang="en-US" b="1" dirty="0" smtClean="0"/>
-              <a:t>Pros</a:t>
-            </a:r>
-          </a:p>
-          <a:p>
-            <a:pPr>
-              <a:buFontTx/>
-              <a:buChar char="-"/>
-            </a:pPr>
-            <a:r>
-              <a:rPr lang="en-US" dirty="0" smtClean="0"/>
-              <a:t>Quick overview</a:t>
-            </a:r>
-          </a:p>
-          <a:p>
-            <a:pPr>
-              <a:buFontTx/>
-              <a:buChar char="-"/>
             </a:pPr>
             <a:endParaRPr lang="en-US" dirty="0" smtClean="0"/>
           </a:p>
           <a:p>
-            <a:pPr>
-              <a:buFontTx/>
-              <a:buChar char="-"/>
+            <a:pPr marL="0" indent="0">
+              <a:buNone/>
             </a:pPr>
-            <a:endParaRPr lang="en-US" dirty="0"/>
-          </a:p>
-          <a:p>
-            <a:pPr>
-              <a:buFontTx/>
-              <a:buChar char="-"/>
-            </a:pPr>
-            <a:endParaRPr lang="en-US" dirty="0" smtClean="0"/>
-          </a:p>
-          <a:p>
-            <a:pPr>
-              <a:buFontTx/>
-              <a:buChar char="-"/>
-            </a:pPr>
-            <a:endParaRPr lang="en-US" dirty="0"/>
-          </a:p>
-          <a:p>
-            <a:pPr marL="0" indent="0">
-              <a:buNone/>
-            </a:pPr>
-            <a:endParaRPr lang="en-US" dirty="0"/>
-          </a:p>
-          <a:p>
-            <a:pPr marL="0" indent="0">
-              <a:buNone/>
-            </a:pPr>
-            <a:r>
-              <a:rPr lang="en-US" dirty="0" smtClean="0"/>
-              <a:t>Cons</a:t>
-            </a:r>
-            <a:endParaRPr lang="en-US" dirty="0"/>
+            <a:r>
+              <a:rPr lang="en-US" dirty="0" smtClean="0"/>
+              <a:t>This includes </a:t>
+            </a:r>
+            <a:r>
+              <a:rPr lang="en-US" dirty="0"/>
+              <a:t>the logic of </a:t>
+            </a:r>
+            <a:r>
+              <a:rPr lang="en-US" dirty="0" smtClean="0"/>
+              <a:t>design</a:t>
+            </a:r>
+            <a:r>
+              <a:rPr lang="en-US" dirty="0"/>
+              <a:t>, data collection techniques, and specific approaches to data analysis.</a:t>
+            </a:r>
           </a:p>
         </p:txBody>
       </p:sp>
     </p:spTree>
     <p:extLst>
       <p:ext uri="{BB962C8B-B14F-4D97-AF65-F5344CB8AC3E}">
-        <p14:creationId xmlns:p14="http://schemas.microsoft.com/office/powerpoint/2010/main" val="1047541330"/>
+        <p14:creationId xmlns:p14="http://schemas.microsoft.com/office/powerpoint/2010/main" val="3965100523"/>
       </p:ext>
     </p:extLst>
   </p:cSld>
@@ -5097,7 +5275,7 @@
           <a:p>
             <a:r>
               <a:rPr lang="en-US" dirty="0" smtClean="0"/>
-              <a:t>Frameworks for Case Study</a:t>
+              <a:t>What is the case? </a:t>
             </a:r>
             <a:endParaRPr lang="en-US" dirty="0"/>
           </a:p>
@@ -5116,58 +5294,107 @@
         <p:spPr/>
         <p:txBody>
           <a:bodyPr>
-            <a:normAutofit/>
+            <a:normAutofit fontScale="92500" lnSpcReduction="20000"/>
           </a:bodyPr>
           <a:lstStyle/>
           <a:p>
-            <a:r>
-              <a:rPr lang="en-US" dirty="0" smtClean="0"/>
-              <a:t>Institution and Organizational level</a:t>
-            </a:r>
-          </a:p>
-          <a:p>
-            <a:pPr lvl="1"/>
-            <a:r>
-              <a:rPr lang="en-US" dirty="0" smtClean="0"/>
-              <a:t>Formal </a:t>
-            </a:r>
-          </a:p>
-          <a:p>
-            <a:pPr lvl="2"/>
-            <a:r>
-              <a:rPr lang="en-US" dirty="0" smtClean="0"/>
-              <a:t>Social Science Case studies (Yin, 2014)</a:t>
-            </a:r>
-          </a:p>
-          <a:p>
-            <a:pPr lvl="1"/>
-            <a:r>
-              <a:rPr lang="en-US" dirty="0" smtClean="0"/>
-              <a:t>Informal</a:t>
-            </a:r>
-          </a:p>
-          <a:p>
-            <a:pPr lvl="2"/>
-            <a:r>
-              <a:rPr lang="en-US" dirty="0" smtClean="0"/>
-              <a:t>‘Landscape studies’ (Akers et al, 2014)</a:t>
+            <a:pPr>
+              <a:buFontTx/>
+              <a:buChar char="-"/>
+            </a:pPr>
+            <a:r>
+              <a:rPr lang="en-US" dirty="0" smtClean="0"/>
+              <a:t>Investigates </a:t>
+            </a:r>
+            <a:r>
+              <a:rPr lang="en-US" dirty="0"/>
+              <a:t>a contemporary phenomenon within its real-life </a:t>
+            </a:r>
+            <a:r>
+              <a:rPr lang="en-US" dirty="0" smtClean="0"/>
+              <a:t>context</a:t>
             </a:r>
             <a:endParaRPr lang="en-US" dirty="0"/>
           </a:p>
           <a:p>
-            <a:r>
-              <a:rPr lang="en-US" dirty="0" smtClean="0"/>
-              <a:t>Unit / department / individual level:</a:t>
-            </a:r>
-          </a:p>
-          <a:p>
-            <a:pPr lvl="1"/>
-            <a:r>
-              <a:rPr lang="en-US" dirty="0" smtClean="0"/>
-              <a:t>Data Curation profiles (in laboratory)</a:t>
-            </a:r>
-          </a:p>
-          <a:p>
+            <a:pPr>
+              <a:buFontTx/>
+              <a:buChar char="-"/>
+            </a:pPr>
+            <a:r>
+              <a:rPr lang="en-US" dirty="0" smtClean="0"/>
+              <a:t>Is </a:t>
+            </a:r>
+            <a:r>
+              <a:rPr lang="en-US" dirty="0"/>
+              <a:t>appropriate when the boundaries between phenomenon and context are not clearly </a:t>
+            </a:r>
+            <a:r>
+              <a:rPr lang="en-US" dirty="0" smtClean="0"/>
+              <a:t>evident</a:t>
+            </a:r>
+            <a:endParaRPr lang="en-US" dirty="0"/>
+          </a:p>
+          <a:p>
+            <a:pPr>
+              <a:buFontTx/>
+              <a:buChar char="-"/>
+            </a:pPr>
+            <a:r>
+              <a:rPr lang="en-US" dirty="0" smtClean="0"/>
+              <a:t>Copes </a:t>
+            </a:r>
+            <a:r>
+              <a:rPr lang="en-US" dirty="0"/>
+              <a:t>with the technically distinctive situation in which there will be many more variables of interest than data points</a:t>
+            </a:r>
+            <a:r>
+              <a:rPr lang="en-US" dirty="0" smtClean="0"/>
+              <a:t>,</a:t>
+            </a:r>
+          </a:p>
+          <a:p>
+            <a:pPr>
+              <a:buFontTx/>
+              <a:buChar char="-"/>
+            </a:pPr>
+            <a:r>
+              <a:rPr lang="en-US" dirty="0" smtClean="0"/>
+              <a:t>Relies </a:t>
+            </a:r>
+            <a:r>
+              <a:rPr lang="en-US" dirty="0"/>
+              <a:t>on multiple sources of evidence, with data needing to converge in a triangulating fashion</a:t>
+            </a:r>
+            <a:r>
+              <a:rPr lang="en-US" dirty="0" smtClean="0"/>
+              <a:t>.</a:t>
+            </a:r>
+          </a:p>
+          <a:p>
+            <a:pPr>
+              <a:buFontTx/>
+              <a:buChar char="-"/>
+            </a:pPr>
+            <a:r>
+              <a:rPr lang="en-US" dirty="0" smtClean="0"/>
+              <a:t>Benefits </a:t>
+            </a:r>
+            <a:r>
+              <a:rPr lang="en-US" dirty="0"/>
+              <a:t>from the prior development of theoretical propositions to guide data collection and analysis</a:t>
+            </a:r>
+          </a:p>
+          <a:p>
+            <a:pPr marL="0" indent="0">
+              <a:buNone/>
+            </a:pPr>
+            <a:endParaRPr lang="en-US" dirty="0"/>
+          </a:p>
+          <a:p>
+            <a:pPr marL="0" indent="0">
+              <a:buNone/>
+            </a:pPr>
             <a:endParaRPr lang="en-US" dirty="0"/>
           </a:p>
         </p:txBody>
@@ -5175,7 +5402,7 @@
     </p:spTree>
     <p:extLst>
       <p:ext uri="{BB962C8B-B14F-4D97-AF65-F5344CB8AC3E}">
-        <p14:creationId xmlns:p14="http://schemas.microsoft.com/office/powerpoint/2010/main" val="4138251179"/>
+        <p14:creationId xmlns:p14="http://schemas.microsoft.com/office/powerpoint/2010/main" val="300859991"/>
       </p:ext>
     </p:extLst>
   </p:cSld>
@@ -5219,7 +5446,7 @@
           <a:p>
             <a:r>
               <a:rPr lang="en-US" dirty="0" smtClean="0"/>
-              <a:t>Case Study research</a:t>
+              <a:t>Frameworks for Case Study</a:t>
             </a:r>
             <a:endParaRPr lang="en-US" dirty="0"/>
           </a:p>
@@ -5242,103 +5469,62 @@
           </a:bodyPr>
           <a:lstStyle/>
           <a:p>
-            <a:pPr marL="0" indent="0">
-              <a:buNone/>
-            </a:pPr>
-            <a:r>
-              <a:rPr lang="en-US" dirty="0" smtClean="0"/>
-              <a:t>Following elements: </a:t>
+            <a:r>
+              <a:rPr lang="en-US" dirty="0" smtClean="0"/>
+              <a:t>Institution and Organizational level</a:t>
+            </a:r>
+          </a:p>
+          <a:p>
+            <a:pPr lvl="1"/>
+            <a:r>
+              <a:rPr lang="en-US" dirty="0" smtClean="0"/>
+              <a:t>Formal </a:t>
+            </a:r>
+          </a:p>
+          <a:p>
+            <a:pPr lvl="2"/>
+            <a:r>
+              <a:rPr lang="en-US" dirty="0" smtClean="0"/>
+              <a:t>Social Science Case studies (Yin, 2014)</a:t>
+            </a:r>
+          </a:p>
+          <a:p>
+            <a:pPr lvl="1"/>
+            <a:r>
+              <a:rPr lang="en-US" dirty="0" smtClean="0"/>
+              <a:t>Informal</a:t>
+            </a:r>
+          </a:p>
+          <a:p>
+            <a:pPr lvl="2"/>
+            <a:r>
+              <a:rPr lang="en-US" dirty="0" smtClean="0"/>
+              <a:t>‘Landscape studies’ (Akers et al, 2014)</a:t>
             </a:r>
             <a:endParaRPr lang="en-US" dirty="0"/>
           </a:p>
           <a:p>
-            <a:pPr marL="0" indent="0">
-              <a:buNone/>
-            </a:pPr>
-            <a:r>
-              <a:rPr lang="en-US" dirty="0" smtClean="0"/>
-              <a:t>	1</a:t>
-            </a:r>
-            <a:r>
-              <a:rPr lang="en-US" dirty="0"/>
-              <a:t>. A study's questions</a:t>
-            </a:r>
-          </a:p>
-          <a:p>
-            <a:pPr marL="0" indent="0">
-              <a:buNone/>
-            </a:pPr>
-            <a:r>
-              <a:rPr lang="en-US" dirty="0" smtClean="0"/>
-              <a:t>	2</a:t>
-            </a:r>
-            <a:r>
-              <a:rPr lang="en-US" dirty="0"/>
-              <a:t>. Propositions</a:t>
-            </a:r>
-          </a:p>
-          <a:p>
-            <a:pPr marL="0" indent="0">
-              <a:buNone/>
-            </a:pPr>
-            <a:r>
-              <a:rPr lang="en-US" dirty="0" smtClean="0"/>
-              <a:t>	3</a:t>
-            </a:r>
-            <a:r>
-              <a:rPr lang="en-US" dirty="0"/>
-              <a:t>. Unit(s) of analysis</a:t>
-            </a:r>
-          </a:p>
-          <a:p>
-            <a:pPr marL="0" indent="0">
-              <a:buNone/>
-            </a:pPr>
-            <a:r>
-              <a:rPr lang="en-US" dirty="0" smtClean="0"/>
-              <a:t>	4</a:t>
-            </a:r>
-            <a:r>
-              <a:rPr lang="en-US" dirty="0"/>
-              <a:t>. Logic linking the data to the propositions</a:t>
-            </a:r>
-          </a:p>
-          <a:p>
-            <a:pPr marL="0" indent="0">
-              <a:buNone/>
-            </a:pPr>
-            <a:r>
-              <a:rPr lang="en-US" dirty="0" smtClean="0"/>
-              <a:t>	5</a:t>
-            </a:r>
-            <a:r>
-              <a:rPr lang="en-US" dirty="0"/>
-              <a:t>. Criteria for interpreting the </a:t>
-            </a:r>
-            <a:r>
-              <a:rPr lang="en-US" dirty="0" smtClean="0"/>
-              <a:t>findings </a:t>
-            </a:r>
-          </a:p>
-          <a:p>
-            <a:pPr marL="0" indent="0">
-              <a:buNone/>
-            </a:pPr>
-            <a:r>
-              <a:rPr lang="en-US" dirty="0" smtClean="0"/>
-              <a:t>(</a:t>
-            </a:r>
-            <a:r>
-              <a:rPr lang="en-US" dirty="0"/>
-              <a:t>Yin, 2003).</a:t>
-            </a:r>
+            <a:r>
+              <a:rPr lang="en-US" dirty="0" smtClean="0"/>
+              <a:t>Unit / department / individual level:</a:t>
+            </a:r>
+          </a:p>
+          <a:p>
+            <a:pPr lvl="1"/>
+            <a:r>
+              <a:rPr lang="en-US" dirty="0" smtClean="0"/>
+              <a:t>Data Curation profiles (in laboratory)</a:t>
+            </a:r>
+          </a:p>
+          <a:p>
+            <a:endParaRPr lang="en-US" dirty="0"/>
           </a:p>
         </p:txBody>
       </p:sp>
     </p:spTree>
     <p:extLst>
       <p:ext uri="{BB962C8B-B14F-4D97-AF65-F5344CB8AC3E}">
-        <p14:creationId xmlns:p14="http://schemas.microsoft.com/office/powerpoint/2010/main" val="3526931147"/>
+        <p14:creationId xmlns:p14="http://schemas.microsoft.com/office/powerpoint/2010/main" val="4138251179"/>
       </p:ext>
     </p:extLst>
   </p:cSld>
@@ -5375,19 +5561,14 @@
             <p:ph type="title"/>
           </p:nvPr>
         </p:nvSpPr>
-        <p:spPr>
-          <a:xfrm>
-            <a:off x="457200" y="0"/>
-            <a:ext cx="8229600" cy="1143000"/>
-          </a:xfrm>
-        </p:spPr>
-        <p:txBody>
-          <a:bodyPr/>
-          <a:lstStyle/>
-          <a:p>
-            <a:r>
-              <a:rPr lang="en-US" dirty="0" smtClean="0"/>
-              <a:t>Validity</a:t>
+        <p:spPr/>
+        <p:txBody>
+          <a:bodyPr/>
+          <a:lstStyle/>
+          <a:p>
+            <a:r>
+              <a:rPr lang="en-US" dirty="0" smtClean="0"/>
+              <a:t>Case Study research</a:t>
             </a:r>
             <a:endParaRPr lang="en-US" dirty="0"/>
           </a:p>
@@ -5403,15 +5584,10 @@
             <p:ph idx="1"/>
           </p:nvPr>
         </p:nvSpPr>
-        <p:spPr>
-          <a:xfrm>
-            <a:off x="457200" y="1313754"/>
-            <a:ext cx="8229600" cy="4525963"/>
-          </a:xfrm>
-        </p:spPr>
+        <p:spPr/>
         <p:txBody>
           <a:bodyPr>
-            <a:normAutofit fontScale="85000" lnSpcReduction="20000"/>
+            <a:normAutofit/>
           </a:bodyPr>
           <a:lstStyle/>
           <a:p>
@@ -5419,85 +5595,99 @@
               <a:buNone/>
             </a:pPr>
             <a:r>
-              <a:rPr lang="en-US" b="1" dirty="0" smtClean="0"/>
-              <a:t>Internal Validity</a:t>
-            </a:r>
-            <a:r>
-              <a:rPr lang="en-US" dirty="0" smtClean="0"/>
-              <a:t> Is </a:t>
+              <a:rPr lang="en-US" dirty="0" smtClean="0"/>
+              <a:t>Following elements: </a:t>
+            </a:r>
+            <a:endParaRPr lang="en-US" dirty="0"/>
+          </a:p>
+          <a:p>
+            <a:pPr marL="0" indent="0">
+              <a:buNone/>
+            </a:pPr>
+            <a:r>
+              <a:rPr lang="en-US" dirty="0" smtClean="0"/>
+              <a:t>	1</a:t>
             </a:r>
             <a:r>
               <a:rPr lang="en-US" dirty="0"/>
-              <a:t>largely applicable to causal explanations, and </a:t>
-            </a:r>
-            <a:r>
-              <a:rPr lang="en-US" dirty="0" smtClean="0"/>
-              <a:t>requires </a:t>
+              <a:t>. A study's questions</a:t>
+            </a:r>
+          </a:p>
+          <a:p>
+            <a:pPr marL="0" indent="0">
+              <a:buNone/>
+            </a:pPr>
+            <a:r>
+              <a:rPr lang="en-US" dirty="0" smtClean="0"/>
+              <a:t>	2</a:t>
             </a:r>
             <a:r>
               <a:rPr lang="en-US" dirty="0"/>
-              <a:t>intensive pattern matching, repeated </a:t>
+              <a:t>. Propositions</a:t>
+            </a:r>
+          </a:p>
+          <a:p>
+            <a:pPr marL="0" indent="0">
+              <a:buNone/>
+            </a:pPr>
+            <a:r>
+              <a:rPr lang="en-US" dirty="0" smtClean="0"/>
+              <a:t>	3</a:t>
+            </a:r>
+            <a:r>
+              <a:rPr lang="en-US" dirty="0"/>
+              <a:t>. Unit(s) of analysis</a:t>
+            </a:r>
+          </a:p>
+          <a:p>
+            <a:pPr marL="0" indent="0">
+              <a:buNone/>
+            </a:pPr>
+            <a:r>
+              <a:rPr lang="en-US" dirty="0" smtClean="0"/>
+              <a:t>	4</a:t>
+            </a:r>
+            <a:r>
+              <a:rPr lang="en-US" dirty="0"/>
+              <a:t>. Logic linking the data to the propositions</a:t>
+            </a:r>
+          </a:p>
+          <a:p>
+            <a:pPr marL="0" indent="0">
+              <a:buNone/>
+            </a:pPr>
+            <a:r>
+              <a:rPr lang="en-US" dirty="0" smtClean="0"/>
+              <a:t>	5</a:t>
+            </a:r>
+            <a:r>
+              <a:rPr lang="en-US" dirty="0"/>
+              <a:t>. Criteria for interpreting the </a:t>
             </a:r>
             <a:r>
               <a:rPr lang="en-US" dirty="0" smtClean="0"/>
               <a:t>findings </a:t>
             </a:r>
+          </a:p>
+          <a:p>
+            <a:pPr marL="0" indent="0">
+              <a:buNone/>
+            </a:pPr>
+            <a:r>
+              <a:rPr lang="en-US" dirty="0" smtClean="0"/>
+              <a:t>(</a:t>
+            </a:r>
             <a:r>
               <a:rPr lang="en-US" dirty="0"/>
-              <a:t>across cases, </a:t>
-            </a:r>
-            <a:r>
-              <a:rPr lang="en-US" dirty="0" smtClean="0"/>
-              <a:t>building </a:t>
-            </a:r>
-            <a:r>
-              <a:rPr lang="en-US" dirty="0"/>
-              <a:t>a logic model, and addressing rival explanations in answering a </a:t>
-            </a:r>
-            <a:r>
-              <a:rPr lang="en-US" dirty="0" smtClean="0"/>
-              <a:t>set of </a:t>
-            </a:r>
-            <a:r>
-              <a:rPr lang="en-US" dirty="0"/>
-              <a:t>propositions.</a:t>
-            </a:r>
-          </a:p>
-          <a:p>
-            <a:pPr marL="0" indent="0">
-              <a:buNone/>
-            </a:pPr>
-            <a:endParaRPr lang="en-US" dirty="0" smtClean="0"/>
-          </a:p>
-          <a:p>
-            <a:pPr marL="0" indent="0">
-              <a:buNone/>
-            </a:pPr>
-            <a:r>
-              <a:rPr lang="en-US" b="1" dirty="0" smtClean="0"/>
-              <a:t>External Validity </a:t>
-            </a:r>
-            <a:r>
-              <a:rPr lang="en-US" dirty="0" smtClean="0"/>
-              <a:t>Concerns </a:t>
-            </a:r>
-            <a:r>
-              <a:rPr lang="en-US" dirty="0"/>
-              <a:t>the generalizability of the findings, and the extent to which they are representative of a phenomenon in different contexts. In single cases, external validity is addressed through the use of theory, and comparing or contrasting the support of that theory with the explanations produced from a case study.</a:t>
-            </a:r>
-          </a:p>
-          <a:p>
-            <a:pPr marL="0" indent="0">
-              <a:buNone/>
-            </a:pPr>
-            <a:endParaRPr lang="en-US" b="1" dirty="0"/>
+              <a:t>Yin, 2003).</a:t>
+            </a:r>
           </a:p>
         </p:txBody>
       </p:sp>
     </p:spTree>
     <p:extLst>
       <p:ext uri="{BB962C8B-B14F-4D97-AF65-F5344CB8AC3E}">
-        <p14:creationId xmlns:p14="http://schemas.microsoft.com/office/powerpoint/2010/main" val="2940412255"/>
+        <p14:creationId xmlns:p14="http://schemas.microsoft.com/office/powerpoint/2010/main" val="3526931147"/>
       </p:ext>
     </p:extLst>
   </p:cSld>
@@ -5536,28 +5726,127 @@
         </p:nvSpPr>
         <p:spPr>
           <a:xfrm>
-            <a:off x="457200" y="2135001"/>
+            <a:off x="457200" y="0"/>
             <a:ext cx="8229600" cy="1143000"/>
           </a:xfrm>
         </p:spPr>
         <p:txBody>
+          <a:bodyPr/>
+          <a:lstStyle/>
+          <a:p>
+            <a:r>
+              <a:rPr lang="en-US" dirty="0" smtClean="0"/>
+              <a:t>Validity</a:t>
+            </a:r>
+            <a:endParaRPr lang="en-US" dirty="0"/>
+          </a:p>
+        </p:txBody>
+      </p:sp>
+      <p:sp>
+        <p:nvSpPr>
+          <p:cNvPr id="3" name="Content Placeholder 2"/>
+          <p:cNvSpPr>
+            <a:spLocks noGrp="1"/>
+          </p:cNvSpPr>
+          <p:nvPr>
+            <p:ph idx="1"/>
+          </p:nvPr>
+        </p:nvSpPr>
+        <p:spPr>
+          <a:xfrm>
+            <a:off x="457200" y="1313754"/>
+            <a:ext cx="8229600" cy="4525963"/>
+          </a:xfrm>
+        </p:spPr>
+        <p:txBody>
           <a:bodyPr>
-            <a:normAutofit fontScale="90000"/>
+            <a:normAutofit fontScale="85000" lnSpcReduction="20000"/>
           </a:bodyPr>
           <a:lstStyle/>
           <a:p>
-            <a:r>
-              <a:rPr lang="en-US" dirty="0" smtClean="0"/>
-              <a:t>Some influential case studies in Data Curation </a:t>
-            </a:r>
-            <a:endParaRPr lang="en-US" dirty="0"/>
+            <a:pPr marL="0" indent="0">
+              <a:buNone/>
+            </a:pPr>
+            <a:r>
+              <a:rPr lang="en-US" b="1" dirty="0" smtClean="0"/>
+              <a:t>Internal Validity</a:t>
+            </a:r>
+            <a:r>
+              <a:rPr lang="en-US" dirty="0" smtClean="0"/>
+              <a:t> Is </a:t>
+            </a:r>
+            <a:r>
+              <a:rPr lang="en-US" dirty="0"/>
+              <a:t>largely applicable to causal explanations, and </a:t>
+            </a:r>
+            <a:r>
+              <a:rPr lang="en-US" dirty="0" smtClean="0"/>
+              <a:t>requires </a:t>
+            </a:r>
+            <a:r>
+              <a:rPr lang="en-US" dirty="0"/>
+              <a:t>intensive pattern matching, repeated </a:t>
+            </a:r>
+            <a:r>
+              <a:rPr lang="en-US" dirty="0" smtClean="0"/>
+              <a:t>findings </a:t>
+            </a:r>
+            <a:r>
+              <a:rPr lang="en-US" dirty="0"/>
+              <a:t>across cases, </a:t>
+            </a:r>
+            <a:r>
+              <a:rPr lang="en-US" dirty="0" smtClean="0"/>
+              <a:t>building </a:t>
+            </a:r>
+            <a:r>
+              <a:rPr lang="en-US" dirty="0"/>
+              <a:t>a logic model, and addressing rival explanations in answering a </a:t>
+            </a:r>
+            <a:r>
+              <a:rPr lang="en-US" dirty="0" smtClean="0"/>
+              <a:t>set of </a:t>
+            </a:r>
+            <a:r>
+              <a:rPr lang="en-US" dirty="0"/>
+              <a:t>propositions.</a:t>
+            </a:r>
+          </a:p>
+          <a:p>
+            <a:pPr marL="0" indent="0">
+              <a:buNone/>
+            </a:pPr>
+            <a:endParaRPr lang="en-US" dirty="0" smtClean="0"/>
+          </a:p>
+          <a:p>
+            <a:pPr marL="0" indent="0">
+              <a:buNone/>
+            </a:pPr>
+            <a:r>
+              <a:rPr lang="en-US" b="1" dirty="0" smtClean="0"/>
+              <a:t>External Validity </a:t>
+            </a:r>
+            <a:r>
+              <a:rPr lang="en-US" dirty="0" smtClean="0"/>
+              <a:t>Concerns </a:t>
+            </a:r>
+            <a:r>
+              <a:rPr lang="en-US" dirty="0"/>
+              <a:t>the generalizability of the findings, and the extent to which they are representative of a phenomenon in different contexts. In single cases, external validity is addressed through the use of theory, and comparing or contrasting the support of that theory with the explanations produced from a case study.</a:t>
+            </a:r>
+          </a:p>
+          <a:p>
+            <a:pPr marL="0" indent="0">
+              <a:buNone/>
+            </a:pPr>
+            <a:endParaRPr lang="en-US" b="1" dirty="0"/>
           </a:p>
         </p:txBody>
       </p:sp>
     </p:spTree>
     <p:extLst>
       <p:ext uri="{BB962C8B-B14F-4D97-AF65-F5344CB8AC3E}">
-        <p14:creationId xmlns:p14="http://schemas.microsoft.com/office/powerpoint/2010/main" val="130806245"/>
+        <p14:creationId xmlns:p14="http://schemas.microsoft.com/office/powerpoint/2010/main" val="2940412255"/>
       </p:ext>
     </p:extLst>
   </p:cSld>
@@ -5594,199 +5883,21 @@
             <p:ph type="title"/>
           </p:nvPr>
         </p:nvSpPr>
-        <p:spPr/>
-        <p:txBody>
-          <a:bodyPr/>
-          <a:lstStyle/>
-          <a:p>
-            <a:r>
-              <a:rPr lang="en-US" dirty="0" smtClean="0"/>
-              <a:t>ARL 2010</a:t>
-            </a:r>
-            <a:endParaRPr lang="en-US" dirty="0"/>
-          </a:p>
-        </p:txBody>
-      </p:sp>
-      <p:sp>
-        <p:nvSpPr>
-          <p:cNvPr id="4" name="Rectangle 3"/>
-          <p:cNvSpPr/>
-          <p:nvPr/>
-        </p:nvSpPr>
         <p:spPr>
           <a:xfrm>
-            <a:off x="191486" y="1450359"/>
-            <a:ext cx="8331402" cy="1754327"/>
+            <a:off x="457200" y="2135001"/>
+            <a:ext cx="8229600" cy="1143000"/>
           </a:xfrm>
-          <a:prstGeom prst="rect">
-            <a:avLst/>
-          </a:prstGeom>
         </p:spPr>
         <p:txBody>
-          <a:bodyPr wrap="square">
-            <a:spAutoFit/>
+          <a:bodyPr>
+            <a:normAutofit fontScale="90000"/>
           </a:bodyPr>
           <a:lstStyle/>
           <a:p>
             <a:r>
-              <a:rPr lang="en-US" b="1" dirty="0" smtClean="0"/>
-              <a:t>Purpose</a:t>
-            </a:r>
-            <a:r>
-              <a:rPr lang="en-US" dirty="0" smtClean="0"/>
-              <a:t>  </a:t>
-            </a:r>
-            <a:endParaRPr lang="en-US" dirty="0" smtClean="0"/>
-          </a:p>
-          <a:p>
-            <a:endParaRPr lang="en-US" dirty="0"/>
-          </a:p>
-          <a:p>
-            <a:r>
-              <a:rPr lang="en-US" dirty="0" smtClean="0"/>
-              <a:t>….build </a:t>
-            </a:r>
-            <a:r>
-              <a:rPr lang="en-US" dirty="0"/>
-              <a:t>an understanding </a:t>
-            </a:r>
-            <a:r>
-              <a:rPr lang="en-US" dirty="0" smtClean="0"/>
-              <a:t>of how </a:t>
-            </a:r>
-            <a:r>
-              <a:rPr lang="en-US" dirty="0"/>
-              <a:t>libraries can contribute to </a:t>
-            </a:r>
-            <a:r>
-              <a:rPr lang="en-US" dirty="0" smtClean="0"/>
-              <a:t>e</a:t>
-            </a:r>
-            <a:r>
-              <a:rPr lang="en-US" dirty="0"/>
-              <a:t>S</a:t>
-            </a:r>
-            <a:r>
-              <a:rPr lang="en-US" dirty="0" smtClean="0"/>
-              <a:t>cience </a:t>
-            </a:r>
-            <a:r>
-              <a:rPr lang="en-US" dirty="0"/>
-              <a:t>activities in </a:t>
-            </a:r>
-            <a:r>
-              <a:rPr lang="en-US" dirty="0" smtClean="0"/>
-              <a:t>their institution”</a:t>
-            </a:r>
-          </a:p>
-          <a:p>
-            <a:endParaRPr lang="en-US" dirty="0"/>
-          </a:p>
-          <a:p>
-            <a:endParaRPr lang="en-US" b="1" dirty="0"/>
-          </a:p>
-        </p:txBody>
-      </p:sp>
-      <p:sp>
-        <p:nvSpPr>
-          <p:cNvPr id="7" name="Rectangle 6"/>
-          <p:cNvSpPr/>
-          <p:nvPr/>
-        </p:nvSpPr>
-        <p:spPr>
-          <a:xfrm>
-            <a:off x="347460" y="2577114"/>
-            <a:ext cx="7629516" cy="2862323"/>
-          </a:xfrm>
-          <a:prstGeom prst="rect">
-            <a:avLst/>
-          </a:prstGeom>
-        </p:spPr>
-        <p:txBody>
-          <a:bodyPr wrap="square">
-            <a:spAutoFit/>
-          </a:bodyPr>
-          <a:lstStyle/>
-          <a:p>
-            <a:endParaRPr lang="en-US" dirty="0" smtClean="0"/>
-          </a:p>
-          <a:p>
-            <a:r>
-              <a:rPr lang="en-US" dirty="0" smtClean="0"/>
-              <a:t>…</a:t>
-            </a:r>
-            <a:r>
-              <a:rPr lang="en-US" dirty="0" smtClean="0"/>
-              <a:t>survey </a:t>
-            </a:r>
-            <a:r>
-              <a:rPr lang="en-US" dirty="0"/>
-              <a:t>gathered 57 responses </a:t>
-            </a:r>
-            <a:r>
-              <a:rPr lang="en-US" dirty="0" smtClean="0"/>
-              <a:t>to the </a:t>
-            </a:r>
-            <a:r>
-              <a:rPr lang="en-US" dirty="0"/>
-              <a:t>survey from the 123 ARL member libraries in the </a:t>
-            </a:r>
-            <a:r>
-              <a:rPr lang="en-US" dirty="0" smtClean="0"/>
-              <a:t>United States </a:t>
-            </a:r>
-            <a:r>
-              <a:rPr lang="en-US" dirty="0"/>
-              <a:t>and Canada. </a:t>
-            </a:r>
-            <a:endParaRPr lang="en-US" dirty="0" smtClean="0"/>
-          </a:p>
-          <a:p>
-            <a:endParaRPr lang="en-US" dirty="0"/>
-          </a:p>
-          <a:p>
-            <a:r>
-              <a:rPr lang="en-US" dirty="0" smtClean="0"/>
-              <a:t>Twenty</a:t>
-            </a:r>
-            <a:r>
-              <a:rPr lang="en-US" dirty="0"/>
-              <a:t>-one respondents report </a:t>
-            </a:r>
-            <a:r>
-              <a:rPr lang="en-US" dirty="0" smtClean="0"/>
-              <a:t>their institution </a:t>
-            </a:r>
-            <a:r>
-              <a:rPr lang="en-US" dirty="0"/>
-              <a:t>provides infrastructure or support services for </a:t>
-            </a:r>
-            <a:r>
-              <a:rPr lang="en-US" dirty="0" smtClean="0"/>
-              <a:t>eScience, 23 </a:t>
-            </a:r>
-            <a:r>
-              <a:rPr lang="en-US" dirty="0"/>
-              <a:t>institutions are in the planning stages, and 13 do</a:t>
-            </a:r>
-          </a:p>
-          <a:p>
-            <a:r>
-              <a:rPr lang="en-US" dirty="0"/>
-              <a:t>not provide support for e-</a:t>
-            </a:r>
-            <a:r>
-              <a:rPr lang="en-US" dirty="0" smtClean="0"/>
-              <a:t>science. </a:t>
-            </a:r>
-          </a:p>
-          <a:p>
-            <a:endParaRPr lang="en-US" dirty="0"/>
-          </a:p>
-          <a:p>
-            <a:r>
-              <a:rPr lang="en-US" dirty="0" smtClean="0"/>
-              <a:t>From 21 eScience providers…. 6 case studies conducted (in-depth interviews, profiles of institutional capacity, etc.)</a:t>
+              <a:rPr lang="en-US" dirty="0" smtClean="0"/>
+              <a:t>Some influential case studies in Data Curation </a:t>
             </a:r>
             <a:endParaRPr lang="en-US" dirty="0"/>
           </a:p>
@@ -5795,7 +5906,7 @@
     </p:spTree>
     <p:extLst>
       <p:ext uri="{BB962C8B-B14F-4D97-AF65-F5344CB8AC3E}">
-        <p14:creationId xmlns:p14="http://schemas.microsoft.com/office/powerpoint/2010/main" val="521826092"/>
+        <p14:creationId xmlns:p14="http://schemas.microsoft.com/office/powerpoint/2010/main" val="130806245"/>
       </p:ext>
     </p:extLst>
   </p:cSld>
@@ -5839,7 +5950,7 @@
           <a:p>
             <a:r>
               <a:rPr lang="en-US" dirty="0" smtClean="0"/>
-              <a:t>Findings</a:t>
+              <a:t>ARL 2010</a:t>
             </a:r>
             <a:endParaRPr lang="en-US" dirty="0"/>
           </a:p>
@@ -5853,8 +5964,8 @@
         </p:nvSpPr>
         <p:spPr>
           <a:xfrm>
-            <a:off x="670550" y="3445111"/>
-            <a:ext cx="7919183" cy="923330"/>
+            <a:off x="191486" y="1450359"/>
+            <a:ext cx="8331402" cy="1754327"/>
           </a:xfrm>
           <a:prstGeom prst="rect">
             <a:avLst/>
@@ -5867,46 +5978,73 @@
           <a:lstStyle/>
           <a:p>
             <a:r>
+              <a:rPr lang="en-US" b="1" dirty="0" smtClean="0"/>
+              <a:t>Purpose</a:t>
+            </a:r>
+            <a:r>
+              <a:rPr lang="en-US" dirty="0" smtClean="0"/>
+              <a:t>  </a:t>
+            </a:r>
+          </a:p>
+          <a:p>
+            <a:endParaRPr lang="en-US" dirty="0"/>
+          </a:p>
+          <a:p>
+            <a:r>
+              <a:rPr lang="en-US" dirty="0" smtClean="0"/>
+              <a:t>….build </a:t>
+            </a:r>
+            <a:r>
               <a:rPr lang="en-US" dirty="0"/>
-              <a:t> “This area is very important, but is </a:t>
-            </a:r>
-            <a:r>
-              <a:rPr lang="en-US" dirty="0" smtClean="0"/>
-              <a:t>much larger </a:t>
+              <a:t>an understanding </a:t>
+            </a:r>
+            <a:r>
+              <a:rPr lang="en-US" dirty="0" smtClean="0"/>
+              <a:t>of how </a:t>
             </a:r>
             <a:r>
               <a:rPr lang="en-US" dirty="0"/>
-              <a:t>than a single institution. We need a national </a:t>
-            </a:r>
-            <a:r>
-              <a:rPr lang="en-US" dirty="0" smtClean="0"/>
-              <a:t>framework for </a:t>
+              <a:t>libraries can contribute to </a:t>
+            </a:r>
+            <a:r>
+              <a:rPr lang="en-US" dirty="0" smtClean="0"/>
+              <a:t>e</a:t>
             </a:r>
             <a:r>
               <a:rPr lang="en-US" dirty="0"/>
-              <a:t>addressing the management, re-use and </a:t>
-            </a:r>
-            <a:r>
-              <a:rPr lang="en-US" dirty="0" smtClean="0"/>
-              <a:t>preservation of </a:t>
+              <a:t>S</a:t>
+            </a:r>
+            <a:r>
+              <a:rPr lang="en-US" dirty="0" smtClean="0"/>
+              <a:t>cience </a:t>
             </a:r>
             <a:r>
               <a:rPr lang="en-US" dirty="0"/>
-              <a:t>scientific data.”</a:t>
-            </a:r>
-          </a:p>
-        </p:txBody>
-      </p:sp>
-      <p:sp>
-        <p:nvSpPr>
-          <p:cNvPr id="3" name="Rectangle 2"/>
+              <a:t>activities in </a:t>
+            </a:r>
+            <a:r>
+              <a:rPr lang="en-US" dirty="0" smtClean="0"/>
+              <a:t>their institution”</a:t>
+            </a:r>
+          </a:p>
+          <a:p>
+            <a:endParaRPr lang="en-US" dirty="0"/>
+          </a:p>
+          <a:p>
+            <a:endParaRPr lang="en-US" b="1" dirty="0"/>
+          </a:p>
+        </p:txBody>
+      </p:sp>
+      <p:sp>
+        <p:nvSpPr>
+          <p:cNvPr id="7" name="Rectangle 6"/>
           <p:cNvSpPr/>
           <p:nvPr/>
         </p:nvSpPr>
         <p:spPr>
           <a:xfrm>
-            <a:off x="770819" y="1740122"/>
-            <a:ext cx="7818914" cy="1200329"/>
+            <a:off x="347460" y="2577114"/>
+            <a:ext cx="7629516" cy="2862323"/>
           </a:xfrm>
           <a:prstGeom prst="rect">
             <a:avLst/>
@@ -5918,87 +6056,90 @@
           </a:bodyPr>
           <a:lstStyle/>
           <a:p>
+            <a:endParaRPr lang="en-US" dirty="0" smtClean="0"/>
+          </a:p>
+          <a:p>
+            <a:r>
+              <a:rPr lang="en-US" dirty="0" smtClean="0"/>
+              <a:t>…survey </a:t>
+            </a:r>
             <a:r>
               <a:rPr lang="en-US" dirty="0"/>
-              <a:t>Many survey respondents </a:t>
-            </a:r>
-            <a:r>
-              <a:rPr lang="en-US" dirty="0" smtClean="0"/>
-              <a:t>cited</a:t>
-            </a:r>
-            <a:r>
-              <a:rPr lang="en-US" b="1" dirty="0" smtClean="0"/>
-              <a:t> lack </a:t>
-            </a:r>
-            <a:r>
-              <a:rPr lang="en-US" b="1" dirty="0"/>
-              <a:t>of money and resources as the most obvious </a:t>
-            </a:r>
-            <a:r>
-              <a:rPr lang="en-US" dirty="0" smtClean="0"/>
-              <a:t>physical limitations </a:t>
+              <a:t>gathered 57 responses </a:t>
+            </a:r>
+            <a:r>
+              <a:rPr lang="en-US" dirty="0" smtClean="0"/>
+              <a:t>to the </a:t>
             </a:r>
             <a:r>
               <a:rPr lang="en-US" dirty="0"/>
-              <a:t>to quick mobilization around these issues. However,</a:t>
-            </a:r>
-          </a:p>
-          <a:p>
-            <a:r>
-              <a:rPr lang="en-US" b="1" dirty="0"/>
-              <a:t>just as compelling were pressures from lack of </a:t>
-            </a:r>
-            <a:r>
-              <a:rPr lang="en-US" b="1" dirty="0" smtClean="0"/>
-              <a:t>faculty interest </a:t>
+              <a:t>survey from the 123 ARL member libraries in the </a:t>
+            </a:r>
+            <a:r>
+              <a:rPr lang="en-US" dirty="0" smtClean="0"/>
+              <a:t>United States </a:t>
             </a:r>
             <a:r>
               <a:rPr lang="en-US" dirty="0"/>
-              <a:t>and common direction on campus. </a:t>
-            </a:r>
-          </a:p>
-        </p:txBody>
-      </p:sp>
-      <p:sp>
-        <p:nvSpPr>
-          <p:cNvPr id="5" name="Rectangle 4"/>
-          <p:cNvSpPr/>
-          <p:nvPr/>
-        </p:nvSpPr>
-        <p:spPr>
-          <a:xfrm>
-            <a:off x="2776204" y="5391103"/>
-            <a:ext cx="3507337" cy="215444"/>
-          </a:xfrm>
-          <a:prstGeom prst="rect">
-            <a:avLst/>
-          </a:prstGeom>
-        </p:spPr>
-        <p:txBody>
-          <a:bodyPr wrap="square">
-            <a:spAutoFit/>
-          </a:bodyPr>
-          <a:lstStyle/>
-          <a:p>
-            <a:r>
-              <a:rPr lang="en-US" sz="800" dirty="0"/>
-              <a:t>http://</a:t>
-            </a:r>
-            <a:r>
-              <a:rPr lang="en-US" sz="800" dirty="0" err="1"/>
-              <a:t>www.arl.org</a:t>
-            </a:r>
-            <a:r>
-              <a:rPr lang="en-US" sz="800" dirty="0"/>
-              <a:t>/storage/documents/publications/escience-report-2010.pdf</a:t>
-            </a:r>
+              <a:t>and Canada. </a:t>
+            </a:r>
+            <a:endParaRPr lang="en-US" dirty="0" smtClean="0"/>
+          </a:p>
+          <a:p>
+            <a:endParaRPr lang="en-US" dirty="0"/>
+          </a:p>
+          <a:p>
+            <a:r>
+              <a:rPr lang="en-US" dirty="0" smtClean="0"/>
+              <a:t>Twenty</a:t>
+            </a:r>
+            <a:r>
+              <a:rPr lang="en-US" dirty="0"/>
+              <a:t>-one respondents report </a:t>
+            </a:r>
+            <a:r>
+              <a:rPr lang="en-US" dirty="0" smtClean="0"/>
+              <a:t>their institution </a:t>
+            </a:r>
+            <a:r>
+              <a:rPr lang="en-US" dirty="0"/>
+              <a:t>provides infrastructure or support services for </a:t>
+            </a:r>
+            <a:r>
+              <a:rPr lang="en-US" dirty="0" smtClean="0"/>
+              <a:t>eScience, 23 </a:t>
+            </a:r>
+            <a:r>
+              <a:rPr lang="en-US" dirty="0"/>
+              <a:t>institutions are in the planning stages, and 13 do</a:t>
+            </a:r>
+          </a:p>
+          <a:p>
+            <a:r>
+              <a:rPr lang="en-US" dirty="0"/>
+              <a:t>not provide support for e-</a:t>
+            </a:r>
+            <a:r>
+              <a:rPr lang="en-US" dirty="0" smtClean="0"/>
+              <a:t>science. </a:t>
+            </a:r>
+          </a:p>
+          <a:p>
+            <a:endParaRPr lang="en-US" dirty="0"/>
+          </a:p>
+          <a:p>
+            <a:r>
+              <a:rPr lang="en-US" dirty="0" smtClean="0"/>
+              <a:t>From 21 eScience providers…. 6 case studies conducted (in-depth interviews, profiles of institutional capacity, etc.)</a:t>
+            </a:r>
+            <a:endParaRPr lang="en-US" dirty="0"/>
           </a:p>
         </p:txBody>
       </p:sp>
     </p:spTree>
     <p:extLst>
       <p:ext uri="{BB962C8B-B14F-4D97-AF65-F5344CB8AC3E}">
-        <p14:creationId xmlns:p14="http://schemas.microsoft.com/office/powerpoint/2010/main" val="114148858"/>
+        <p14:creationId xmlns:p14="http://schemas.microsoft.com/office/powerpoint/2010/main" val="521826092"/>
       </p:ext>
     </p:extLst>
   </p:cSld>

</xml_diff>